<commit_message>
added relevant information to the slides
</commit_message>
<xml_diff>
--- a/Email_Sender_Application_Presentation.pptx
+++ b/Email_Sender_Application_Presentation.pptx
@@ -302,7 +302,7 @@
           <a:p>
             <a:fld id="{5BCAD085-E8A6-8845-BD4E-CB4CCA059FC4}" type="datetimeFigureOut">
               <a:rPr lang="en-US" smtClean="0"/>
-              <a:t>6/6/2025</a:t>
+              <a:t>6/12/2025</a:t>
             </a:fld>
             <a:endParaRPr lang="en-US"/>
           </a:p>
@@ -569,7 +569,7 @@
           <a:p>
             <a:fld id="{5BCAD085-E8A6-8845-BD4E-CB4CCA059FC4}" type="datetimeFigureOut">
               <a:rPr lang="en-US" smtClean="0"/>
-              <a:t>6/6/2025</a:t>
+              <a:t>6/12/2025</a:t>
             </a:fld>
             <a:endParaRPr lang="en-US"/>
           </a:p>
@@ -800,7 +800,7 @@
           <a:p>
             <a:fld id="{5BCAD085-E8A6-8845-BD4E-CB4CCA059FC4}" type="datetimeFigureOut">
               <a:rPr lang="en-US" smtClean="0"/>
-              <a:t>6/6/2025</a:t>
+              <a:t>6/12/2025</a:t>
             </a:fld>
             <a:endParaRPr lang="en-US"/>
           </a:p>
@@ -1110,7 +1110,7 @@
           <a:p>
             <a:fld id="{5BCAD085-E8A6-8845-BD4E-CB4CCA059FC4}" type="datetimeFigureOut">
               <a:rPr lang="en-US" smtClean="0"/>
-              <a:t>6/6/2025</a:t>
+              <a:t>6/12/2025</a:t>
             </a:fld>
             <a:endParaRPr lang="en-US"/>
           </a:p>
@@ -1583,7 +1583,7 @@
           <a:p>
             <a:fld id="{5BCAD085-E8A6-8845-BD4E-CB4CCA059FC4}" type="datetimeFigureOut">
               <a:rPr lang="en-US" smtClean="0"/>
-              <a:t>6/6/2025</a:t>
+              <a:t>6/12/2025</a:t>
             </a:fld>
             <a:endParaRPr lang="en-US"/>
           </a:p>
@@ -2130,7 +2130,7 @@
           <a:p>
             <a:fld id="{5BCAD085-E8A6-8845-BD4E-CB4CCA059FC4}" type="datetimeFigureOut">
               <a:rPr lang="en-US" smtClean="0"/>
-              <a:t>6/6/2025</a:t>
+              <a:t>6/12/2025</a:t>
             </a:fld>
             <a:endParaRPr lang="en-US"/>
           </a:p>
@@ -2904,7 +2904,7 @@
           <a:p>
             <a:fld id="{5BCAD085-E8A6-8845-BD4E-CB4CCA059FC4}" type="datetimeFigureOut">
               <a:rPr lang="en-US" smtClean="0"/>
-              <a:t>6/6/2025</a:t>
+              <a:t>6/12/2025</a:t>
             </a:fld>
             <a:endParaRPr lang="en-US"/>
           </a:p>
@@ -3079,7 +3079,7 @@
           <a:p>
             <a:fld id="{5BCAD085-E8A6-8845-BD4E-CB4CCA059FC4}" type="datetimeFigureOut">
               <a:rPr lang="en-US" smtClean="0"/>
-              <a:t>6/6/2025</a:t>
+              <a:t>6/12/2025</a:t>
             </a:fld>
             <a:endParaRPr lang="en-US"/>
           </a:p>
@@ -3302,7 +3302,7 @@
           <a:p>
             <a:fld id="{5BCAD085-E8A6-8845-BD4E-CB4CCA059FC4}" type="datetimeFigureOut">
               <a:rPr lang="en-US" smtClean="0"/>
-              <a:t>6/6/2025</a:t>
+              <a:t>6/12/2025</a:t>
             </a:fld>
             <a:endParaRPr lang="en-US"/>
           </a:p>
@@ -3482,7 +3482,7 @@
           <a:p>
             <a:fld id="{5BCAD085-E8A6-8845-BD4E-CB4CCA059FC4}" type="datetimeFigureOut">
               <a:rPr lang="en-US" smtClean="0"/>
-              <a:t>6/6/2025</a:t>
+              <a:t>6/12/2025</a:t>
             </a:fld>
             <a:endParaRPr lang="en-US"/>
           </a:p>
@@ -3771,7 +3771,7 @@
           <a:p>
             <a:fld id="{5BCAD085-E8A6-8845-BD4E-CB4CCA059FC4}" type="datetimeFigureOut">
               <a:rPr lang="en-US" smtClean="0"/>
-              <a:t>6/6/2025</a:t>
+              <a:t>6/12/2025</a:t>
             </a:fld>
             <a:endParaRPr lang="en-US"/>
           </a:p>
@@ -4013,7 +4013,7 @@
           <a:p>
             <a:fld id="{5BCAD085-E8A6-8845-BD4E-CB4CCA059FC4}" type="datetimeFigureOut">
               <a:rPr lang="en-US" smtClean="0"/>
-              <a:t>6/6/2025</a:t>
+              <a:t>6/12/2025</a:t>
             </a:fld>
             <a:endParaRPr lang="en-US"/>
           </a:p>
@@ -4392,7 +4392,7 @@
           <a:p>
             <a:fld id="{5BCAD085-E8A6-8845-BD4E-CB4CCA059FC4}" type="datetimeFigureOut">
               <a:rPr lang="en-US" smtClean="0"/>
-              <a:t>6/6/2025</a:t>
+              <a:t>6/12/2025</a:t>
             </a:fld>
             <a:endParaRPr lang="en-US"/>
           </a:p>
@@ -4510,7 +4510,7 @@
           <a:p>
             <a:fld id="{5BCAD085-E8A6-8845-BD4E-CB4CCA059FC4}" type="datetimeFigureOut">
               <a:rPr lang="en-US" smtClean="0"/>
-              <a:t>6/6/2025</a:t>
+              <a:t>6/12/2025</a:t>
             </a:fld>
             <a:endParaRPr lang="en-US"/>
           </a:p>
@@ -4605,7 +4605,7 @@
           <a:p>
             <a:fld id="{5BCAD085-E8A6-8845-BD4E-CB4CCA059FC4}" type="datetimeFigureOut">
               <a:rPr lang="en-US" smtClean="0"/>
-              <a:t>6/6/2025</a:t>
+              <a:t>6/12/2025</a:t>
             </a:fld>
             <a:endParaRPr lang="en-US"/>
           </a:p>
@@ -4854,7 +4854,7 @@
           <a:p>
             <a:fld id="{5BCAD085-E8A6-8845-BD4E-CB4CCA059FC4}" type="datetimeFigureOut">
               <a:rPr lang="en-US" smtClean="0"/>
-              <a:t>6/6/2025</a:t>
+              <a:t>6/12/2025</a:t>
             </a:fld>
             <a:endParaRPr lang="en-US"/>
           </a:p>
@@ -5111,7 +5111,7 @@
           <a:p>
             <a:fld id="{5BCAD085-E8A6-8845-BD4E-CB4CCA059FC4}" type="datetimeFigureOut">
               <a:rPr lang="en-US" smtClean="0"/>
-              <a:t>6/6/2025</a:t>
+              <a:t>6/12/2025</a:t>
             </a:fld>
             <a:endParaRPr lang="en-US"/>
           </a:p>
@@ -5354,7 +5354,7 @@
           <a:p>
             <a:fld id="{5BCAD085-E8A6-8845-BD4E-CB4CCA059FC4}" type="datetimeFigureOut">
               <a:rPr lang="en-US" smtClean="0"/>
-              <a:t>6/6/2025</a:t>
+              <a:t>6/12/2025</a:t>
             </a:fld>
             <a:endParaRPr lang="en-US"/>
           </a:p>
@@ -6028,8 +6028,20 @@
             </a:r>
             <a:r>
               <a:rPr dirty="0"/>
-              <a:t>messages securely through Gmail using SMTP.</a:t>
-            </a:r>
+              <a:t>messages securely through Gmail using SMTP</a:t>
+            </a:r>
+            <a:r>
+              <a:rPr dirty="0" smtClean="0"/>
+              <a:t>.</a:t>
+            </a:r>
+            <a:endParaRPr lang="en-US" dirty="0" smtClean="0"/>
+          </a:p>
+          <a:p>
+            <a:r>
+              <a:rPr lang="en-US" dirty="0" smtClean="0"/>
+              <a:t>Enables recent email viewing using the IMAP library.</a:t>
+            </a:r>
+            <a:endParaRPr dirty="0"/>
           </a:p>
           <a:p>
             <a:r>
@@ -6120,6 +6132,13 @@
               <a:rPr lang="en-US" dirty="0" smtClean="0"/>
               <a:t>Email_sender.py</a:t>
             </a:r>
+          </a:p>
+          <a:p>
+            <a:r>
+              <a:rPr lang="en-US" dirty="0" smtClean="0"/>
+              <a:t>Email_reader.py</a:t>
+            </a:r>
+            <a:endParaRPr lang="en-US" dirty="0" smtClean="0"/>
           </a:p>
           <a:p>
             <a:r>
@@ -6244,8 +6263,20 @@
             </a:r>
             <a:r>
               <a:rPr dirty="0"/>
-              <a:t>understanding of networking protocols.</a:t>
-            </a:r>
+              <a:t>understanding of networking protocols</a:t>
+            </a:r>
+            <a:r>
+              <a:rPr dirty="0" smtClean="0"/>
+              <a:t>.</a:t>
+            </a:r>
+            <a:endParaRPr lang="en-US" dirty="0" smtClean="0"/>
+          </a:p>
+          <a:p>
+            <a:r>
+              <a:rPr lang="en-US" dirty="0" smtClean="0"/>
+              <a:t>Learn to use IMAP to be able to view email messages in app.</a:t>
+            </a:r>
+            <a:endParaRPr dirty="0"/>
           </a:p>
           <a:p>
             <a:r>
@@ -6364,8 +6395,28 @@
             </a:r>
             <a:r>
               <a:rPr dirty="0"/>
-              <a:t>: Send emails via SMTP</a:t>
-            </a:r>
+              <a:t>: Send emails via </a:t>
+            </a:r>
+            <a:r>
+              <a:rPr dirty="0" smtClean="0"/>
+              <a:t>SMTP</a:t>
+            </a:r>
+            <a:endParaRPr lang="en-US" dirty="0" smtClean="0"/>
+          </a:p>
+          <a:p>
+            <a:r>
+              <a:rPr lang="en-US" dirty="0" err="1"/>
+              <a:t>i</a:t>
+            </a:r>
+            <a:r>
+              <a:rPr lang="en-US" dirty="0" err="1" smtClean="0"/>
+              <a:t>maplib</a:t>
+            </a:r>
+            <a:r>
+              <a:rPr lang="en-US" dirty="0" smtClean="0"/>
+              <a:t>: View emails via IMAP in application</a:t>
+            </a:r>
+            <a:endParaRPr dirty="0"/>
           </a:p>
           <a:p>
             <a:r>
@@ -6480,8 +6531,28 @@
             </a:r>
             <a:r>
               <a:rPr dirty="0"/>
-              <a:t>layouts and widgets</a:t>
-            </a:r>
+              <a:t>layouts and </a:t>
+            </a:r>
+            <a:r>
+              <a:rPr dirty="0" smtClean="0"/>
+              <a:t>widgets</a:t>
+            </a:r>
+            <a:endParaRPr lang="en-US" dirty="0" smtClean="0"/>
+          </a:p>
+          <a:p>
+            <a:r>
+              <a:rPr lang="en-US" dirty="0" smtClean="0"/>
+              <a:t>Separated design and logic (.</a:t>
+            </a:r>
+            <a:r>
+              <a:rPr lang="en-US" dirty="0" err="1" smtClean="0"/>
+              <a:t>kv</a:t>
+            </a:r>
+            <a:r>
+              <a:rPr lang="en-US" dirty="0" smtClean="0"/>
+              <a:t>)</a:t>
+            </a:r>
+            <a:endParaRPr dirty="0"/>
           </a:p>
           <a:p>
             <a:r>
@@ -6592,8 +6663,20 @@
             </a:r>
             <a:r>
               <a:rPr dirty="0"/>
-              <a:t>SMTP server: smtp.gmail.com, Port 587</a:t>
-            </a:r>
+              <a:t>SMTP server: smtp.gmail.com, Port </a:t>
+            </a:r>
+            <a:r>
+              <a:rPr dirty="0" smtClean="0"/>
+              <a:t>587</a:t>
+            </a:r>
+            <a:endParaRPr lang="en-US" dirty="0" smtClean="0"/>
+          </a:p>
+          <a:p>
+            <a:r>
+              <a:rPr lang="en-US" dirty="0" smtClean="0"/>
+              <a:t>Gmail IMAP server: imap.gmail.com (imaplib.IMAP4_SSL</a:t>
+            </a:r>
+            <a:endParaRPr dirty="0"/>
           </a:p>
           <a:p>
             <a:r>
@@ -6619,9 +6702,17 @@
               <a:t>starttls</a:t>
             </a:r>
             <a:r>
-              <a:rPr dirty="0"/>
+              <a:rPr dirty="0" smtClean="0"/>
               <a:t>)</a:t>
             </a:r>
+            <a:endParaRPr lang="en-US" dirty="0" smtClean="0"/>
+          </a:p>
+          <a:p>
+            <a:r>
+              <a:rPr lang="en-US" dirty="0" smtClean="0"/>
+              <a:t>Uses SSL encryption</a:t>
+            </a:r>
+            <a:endParaRPr dirty="0"/>
           </a:p>
         </p:txBody>
       </p:sp>
@@ -6702,8 +6793,20 @@
             </a:r>
             <a:r>
               <a:rPr dirty="0"/>
-              <a:t>format validation with popup alerts</a:t>
-            </a:r>
+              <a:t>format validation with popup </a:t>
+            </a:r>
+            <a:r>
+              <a:rPr dirty="0" smtClean="0"/>
+              <a:t>alerts</a:t>
+            </a:r>
+            <a:endParaRPr lang="en-US" dirty="0" smtClean="0"/>
+          </a:p>
+          <a:p>
+            <a:r>
+              <a:rPr lang="en-US" dirty="0" smtClean="0"/>
+              <a:t>Inbox preview with popup </a:t>
+            </a:r>
+            <a:endParaRPr dirty="0"/>
           </a:p>
           <a:p>
             <a:r>
@@ -6835,8 +6938,33 @@
               <a:t> </a:t>
             </a:r>
             <a:r>
-              <a:rPr dirty="0" err="1"/>
+              <a:rPr dirty="0" err="1" smtClean="0"/>
               <a:t>BoxLayout</a:t>
+            </a:r>
+            <a:endParaRPr lang="en-US" dirty="0" smtClean="0"/>
+          </a:p>
+          <a:p>
+            <a:r>
+              <a:rPr lang="en-US" dirty="0" smtClean="0"/>
+              <a:t>Connecting the app to IMAP server</a:t>
+            </a:r>
+          </a:p>
+          <a:p>
+            <a:r>
+              <a:rPr lang="en-US" dirty="0" smtClean="0"/>
+              <a:t>Rendering html from the inbox preview</a:t>
+            </a:r>
+          </a:p>
+          <a:p>
+            <a:r>
+              <a:rPr lang="en-US" dirty="0" smtClean="0"/>
+              <a:t>Code crashing </a:t>
+            </a:r>
+          </a:p>
+          <a:p>
+            <a:r>
+              <a:rPr lang="en-US" dirty="0" smtClean="0"/>
+              <a:t>IMAP server not syncing with kivy </a:t>
             </a:r>
             <a:endParaRPr dirty="0"/>
           </a:p>

</xml_diff>